<commit_message>
Add ling to Class-Central
</commit_message>
<xml_diff>
--- a/lectures3/Pythonlearn-02-Expressions.pptx
+++ b/lectures3/Pythonlearn-02-Expressions.pptx
@@ -17084,7 +17084,7 @@
               <a:t>'Hello </a:t>
             </a:r>
             <a:r>
-              <a:rPr lang="en-US" sz="3000" b="1" i="0" u="none" strike="noStrike" cap="none" dirty="0">
+              <a:rPr lang="en-US" sz="3000" b="1" i="0" u="none" strike="noStrike" cap="none">
                 <a:solidFill>
                   <a:srgbClr val="FF9900"/>
                 </a:solidFill>
@@ -17096,7 +17096,7 @@
               <a:t>world</a:t>
             </a:r>
             <a:r>
-              <a:rPr lang="en-US" sz="3000" b="1" i="0" u="none" strike="noStrike" cap="none" dirty="0" smtClean="0">
+              <a:rPr lang="en-US" sz="3000" b="1" i="0" u="none" strike="noStrike" cap="none" smtClean="0">
                 <a:solidFill>
                   <a:srgbClr val="FF9900"/>
                 </a:solidFill>
@@ -17108,7 +17108,7 @@
               <a:t>'</a:t>
             </a:r>
             <a:r>
-              <a:rPr lang="en-US" sz="3000" b="1" dirty="0">
+              <a:rPr lang="en-US" sz="3000" b="1" smtClean="0">
                 <a:solidFill>
                   <a:srgbClr val="FFFF00"/>
                 </a:solidFill>
@@ -17117,7 +17117,7 @@
                 <a:cs typeface="Courier New"/>
                 <a:sym typeface="Courier New"/>
               </a:rPr>
-              <a:t> )</a:t>
+              <a:t>)</a:t>
             </a:r>
             <a:endParaRPr lang="en-US" sz="3000" b="1" i="0" u="none" strike="noStrike" cap="none" dirty="0">
               <a:solidFill>

</xml_diff>

<commit_message>
One more Python 3 fail
</commit_message>
<xml_diff>
--- a/lectures3/Pythonlearn-02-Expressions.pptx
+++ b/lectures3/Pythonlearn-02-Expressions.pptx
@@ -9156,17 +9156,26 @@
               <a:buNone/>
             </a:pPr>
             <a:r>
-              <a:rPr lang="en-US" sz="3000" b="1" i="0" u="none" strike="noStrike" cap="none" dirty="0">
-                <a:solidFill>
-                  <a:schemeClr val="lt1"/>
-                </a:solidFill>
-                <a:latin typeface="Courier New"/>
-                <a:ea typeface="Courier New"/>
-                <a:cs typeface="Courier New"/>
-                <a:sym typeface="Courier New"/>
-              </a:rPr>
-              <a:t>5</a:t>
-            </a:r>
+              <a:rPr lang="en-US" sz="3000" b="1" i="0" u="none" strike="noStrike" cap="none" smtClean="0">
+                <a:solidFill>
+                  <a:schemeClr val="lt1"/>
+                </a:solidFill>
+                <a:latin typeface="Courier New"/>
+                <a:ea typeface="Courier New"/>
+                <a:cs typeface="Courier New"/>
+                <a:sym typeface="Courier New"/>
+              </a:rPr>
+              <a:t>5.28</a:t>
+            </a:r>
+            <a:endParaRPr lang="en-US" sz="3000" b="1" i="0" u="none" strike="noStrike" cap="none" dirty="0">
+              <a:solidFill>
+                <a:schemeClr val="lt1"/>
+              </a:solidFill>
+              <a:latin typeface="Courier New"/>
+              <a:ea typeface="Courier New"/>
+              <a:cs typeface="Courier New"/>
+              <a:sym typeface="Courier New"/>
+            </a:endParaRPr>
           </a:p>
         </p:txBody>
       </p:sp>

</xml_diff>

<commit_message>
FIx the type in division
</commit_message>
<xml_diff>
--- a/lectures3/Pythonlearn-02-Expressions.pptx
+++ b/lectures3/Pythonlearn-02-Expressions.pptx
@@ -598,15 +598,7 @@
                   <a:schemeClr val="dk2"/>
                 </a:solidFill>
               </a:rPr>
-              <a:t>acknowledgement page(s</a:t>
-            </a:r>
-            <a:r>
-              <a:rPr lang="en-US" dirty="0" smtClean="0">
-                <a:solidFill>
-                  <a:schemeClr val="dk2"/>
-                </a:solidFill>
-              </a:rPr>
-              <a:t>)</a:t>
+              <a:t>acknowledgement page(s)</a:t>
             </a:r>
             <a:r>
               <a:rPr lang="en-US" baseline="0" dirty="0" smtClean="0">
@@ -9239,19 +9231,7 @@
                 <a:cs typeface="Arial" charset="0"/>
                 <a:sym typeface="Cabin"/>
               </a:rPr>
-              <a:t> 0.6    </a:t>
-            </a:r>
-            <a:r>
-              <a:rPr lang="en-US" sz="4900" dirty="0" smtClean="0">
-                <a:solidFill>
-                  <a:schemeClr val="lt1"/>
-                </a:solidFill>
-                <a:latin typeface="Arial" charset="0"/>
-                <a:ea typeface="Arial" charset="0"/>
-                <a:cs typeface="Arial" charset="0"/>
-                <a:sym typeface="Cabin"/>
-              </a:rPr>
-              <a:t>0.936</a:t>
+              <a:t> 0.6    0.936</a:t>
             </a:r>
             <a:endParaRPr lang="en-US" sz="4900" dirty="0">
               <a:solidFill>
@@ -16264,7 +16244,7 @@
               <a:t>1 + </a:t>
             </a:r>
             <a:r>
-              <a:rPr lang="en-US" sz="3200" u="none" strike="noStrike" cap="none" dirty="0">
+              <a:rPr lang="en-US" sz="3200" u="none" strike="noStrike" cap="none" dirty="0" smtClean="0">
                 <a:solidFill>
                   <a:srgbClr val="00FF00"/>
                 </a:solidFill>
@@ -16273,7 +16253,19 @@
                 <a:cs typeface="Courier" charset="0"/>
                 <a:sym typeface="Cabin"/>
               </a:rPr>
-              <a:t>2 * 5</a:t>
+              <a:t>2.0 </a:t>
+            </a:r>
+            <a:r>
+              <a:rPr lang="en-US" sz="3200" u="none" strike="noStrike" cap="none" dirty="0">
+                <a:solidFill>
+                  <a:srgbClr val="00FF00"/>
+                </a:solidFill>
+                <a:latin typeface="Courier" charset="0"/>
+                <a:ea typeface="Courier" charset="0"/>
+                <a:cs typeface="Courier" charset="0"/>
+                <a:sym typeface="Cabin"/>
+              </a:rPr>
+              <a:t>* 5</a:t>
             </a:r>
           </a:p>
         </p:txBody>
@@ -16356,8 +16348,29 @@
                 <a:cs typeface="Courier" charset="0"/>
                 <a:sym typeface="Cabin"/>
               </a:rPr>
-              <a:t>1 + 10</a:t>
-            </a:r>
+              <a:t>1 + </a:t>
+            </a:r>
+            <a:r>
+              <a:rPr lang="en-US" sz="3200" u="none" strike="noStrike" cap="none" dirty="0" smtClean="0">
+                <a:solidFill>
+                  <a:srgbClr val="FF9900"/>
+                </a:solidFill>
+                <a:latin typeface="Courier" charset="0"/>
+                <a:ea typeface="Courier" charset="0"/>
+                <a:cs typeface="Courier" charset="0"/>
+                <a:sym typeface="Cabin"/>
+              </a:rPr>
+              <a:t>10.0</a:t>
+            </a:r>
+            <a:endParaRPr lang="en-US" sz="3200" u="none" strike="noStrike" cap="none" dirty="0">
+              <a:solidFill>
+                <a:srgbClr val="FF9900"/>
+              </a:solidFill>
+              <a:latin typeface="Courier" charset="0"/>
+              <a:ea typeface="Courier" charset="0"/>
+              <a:cs typeface="Courier" charset="0"/>
+              <a:sym typeface="Cabin"/>
+            </a:endParaRPr>
           </a:p>
         </p:txBody>
       </p:sp>
@@ -16397,8 +16410,8 @@
         </p:nvSpPr>
         <p:spPr>
           <a:xfrm>
-            <a:off x="12085636" y="6934200"/>
-            <a:ext cx="723900" cy="800099"/>
+            <a:off x="12085635" y="6934200"/>
+            <a:ext cx="1048473" cy="800099"/>
           </a:xfrm>
           <a:prstGeom prst="rect">
             <a:avLst/>
@@ -16432,7 +16445,7 @@
               <a:buNone/>
             </a:pPr>
             <a:r>
-              <a:rPr lang="en-US" sz="3200" u="none" strike="noStrike" cap="none" dirty="0">
+              <a:rPr lang="en-US" sz="3200" u="none" strike="noStrike" cap="none" smtClean="0">
                 <a:solidFill>
                   <a:srgbClr val="FF9900"/>
                 </a:solidFill>
@@ -16441,8 +16454,17 @@
                 <a:cs typeface="Courier" charset="0"/>
                 <a:sym typeface="Cabin"/>
               </a:rPr>
-              <a:t>11</a:t>
-            </a:r>
+              <a:t>11.0</a:t>
+            </a:r>
+            <a:endParaRPr lang="en-US" sz="3200" u="none" strike="noStrike" cap="none" dirty="0">
+              <a:solidFill>
+                <a:srgbClr val="FF9900"/>
+              </a:solidFill>
+              <a:latin typeface="Courier" charset="0"/>
+              <a:ea typeface="Courier" charset="0"/>
+              <a:cs typeface="Courier" charset="0"/>
+              <a:sym typeface="Cabin"/>
+            </a:endParaRPr>
           </a:p>
         </p:txBody>
       </p:sp>

</xml_diff>